<commit_message>
Updated Week 1 Presentation 8/26
</commit_message>
<xml_diff>
--- a/Weekly Presentations/Week1.pptx
+++ b/Weekly Presentations/Week1.pptx
@@ -6,7 +6,12 @@
   </p:sldMasterIdLst>
   <p:sldIdLst>
     <p:sldId id="256" r:id="rId2"/>
-    <p:sldId id="257" r:id="rId3"/>
+    <p:sldId id="258" r:id="rId3"/>
+    <p:sldId id="259" r:id="rId4"/>
+    <p:sldId id="260" r:id="rId5"/>
+    <p:sldId id="261" r:id="rId6"/>
+    <p:sldId id="262" r:id="rId7"/>
+    <p:sldId id="257" r:id="rId8"/>
   </p:sldIdLst>
   <p:sldSz cx="12192000" cy="6858000"/>
   <p:notesSz cx="6858000" cy="9144000"/>
@@ -105,6 +110,11 @@
       </a:defRPr>
     </a:lvl9pPr>
   </p:defaultTextStyle>
+  <p:extLst>
+    <p:ext uri="{EFAFB233-063F-42B5-8137-9DF3F51BA10A}">
+      <p15:sldGuideLst xmlns:p15="http://schemas.microsoft.com/office/powerpoint/2012/main"/>
+    </p:ext>
+  </p:extLst>
 </p:presentation>
 </file>
 
@@ -257,7 +267,7 @@
           <a:p>
             <a:fld id="{FEFC8454-BE33-7D4F-BCD8-B3EB2A5BB15E}" type="datetimeFigureOut">
               <a:rPr lang="en-US" smtClean="0"/>
-              <a:t>8/24/20</a:t>
+              <a:t>8/26/20</a:t>
             </a:fld>
             <a:endParaRPr lang="en-US"/>
           </a:p>
@@ -457,7 +467,7 @@
           <a:p>
             <a:fld id="{FEFC8454-BE33-7D4F-BCD8-B3EB2A5BB15E}" type="datetimeFigureOut">
               <a:rPr lang="en-US" smtClean="0"/>
-              <a:t>8/24/20</a:t>
+              <a:t>8/26/20</a:t>
             </a:fld>
             <a:endParaRPr lang="en-US"/>
           </a:p>
@@ -667,7 +677,7 @@
           <a:p>
             <a:fld id="{FEFC8454-BE33-7D4F-BCD8-B3EB2A5BB15E}" type="datetimeFigureOut">
               <a:rPr lang="en-US" smtClean="0"/>
-              <a:t>8/24/20</a:t>
+              <a:t>8/26/20</a:t>
             </a:fld>
             <a:endParaRPr lang="en-US"/>
           </a:p>
@@ -867,7 +877,7 @@
           <a:p>
             <a:fld id="{FEFC8454-BE33-7D4F-BCD8-B3EB2A5BB15E}" type="datetimeFigureOut">
               <a:rPr lang="en-US" smtClean="0"/>
-              <a:t>8/24/20</a:t>
+              <a:t>8/26/20</a:t>
             </a:fld>
             <a:endParaRPr lang="en-US"/>
           </a:p>
@@ -1143,7 +1153,7 @@
           <a:p>
             <a:fld id="{FEFC8454-BE33-7D4F-BCD8-B3EB2A5BB15E}" type="datetimeFigureOut">
               <a:rPr lang="en-US" smtClean="0"/>
-              <a:t>8/24/20</a:t>
+              <a:t>8/26/20</a:t>
             </a:fld>
             <a:endParaRPr lang="en-US"/>
           </a:p>
@@ -1411,7 +1421,7 @@
           <a:p>
             <a:fld id="{FEFC8454-BE33-7D4F-BCD8-B3EB2A5BB15E}" type="datetimeFigureOut">
               <a:rPr lang="en-US" smtClean="0"/>
-              <a:t>8/24/20</a:t>
+              <a:t>8/26/20</a:t>
             </a:fld>
             <a:endParaRPr lang="en-US"/>
           </a:p>
@@ -1826,7 +1836,7 @@
           <a:p>
             <a:fld id="{FEFC8454-BE33-7D4F-BCD8-B3EB2A5BB15E}" type="datetimeFigureOut">
               <a:rPr lang="en-US" smtClean="0"/>
-              <a:t>8/24/20</a:t>
+              <a:t>8/26/20</a:t>
             </a:fld>
             <a:endParaRPr lang="en-US"/>
           </a:p>
@@ -1968,7 +1978,7 @@
           <a:p>
             <a:fld id="{FEFC8454-BE33-7D4F-BCD8-B3EB2A5BB15E}" type="datetimeFigureOut">
               <a:rPr lang="en-US" smtClean="0"/>
-              <a:t>8/24/20</a:t>
+              <a:t>8/26/20</a:t>
             </a:fld>
             <a:endParaRPr lang="en-US"/>
           </a:p>
@@ -2081,7 +2091,7 @@
           <a:p>
             <a:fld id="{FEFC8454-BE33-7D4F-BCD8-B3EB2A5BB15E}" type="datetimeFigureOut">
               <a:rPr lang="en-US" smtClean="0"/>
-              <a:t>8/24/20</a:t>
+              <a:t>8/26/20</a:t>
             </a:fld>
             <a:endParaRPr lang="en-US"/>
           </a:p>
@@ -2394,7 +2404,7 @@
           <a:p>
             <a:fld id="{FEFC8454-BE33-7D4F-BCD8-B3EB2A5BB15E}" type="datetimeFigureOut">
               <a:rPr lang="en-US" smtClean="0"/>
-              <a:t>8/24/20</a:t>
+              <a:t>8/26/20</a:t>
             </a:fld>
             <a:endParaRPr lang="en-US"/>
           </a:p>
@@ -2683,7 +2693,7 @@
           <a:p>
             <a:fld id="{FEFC8454-BE33-7D4F-BCD8-B3EB2A5BB15E}" type="datetimeFigureOut">
               <a:rPr lang="en-US" smtClean="0"/>
-              <a:t>8/24/20</a:t>
+              <a:t>8/26/20</a:t>
             </a:fld>
             <a:endParaRPr lang="en-US"/>
           </a:p>
@@ -2926,7 +2936,7 @@
           <a:p>
             <a:fld id="{FEFC8454-BE33-7D4F-BCD8-B3EB2A5BB15E}" type="datetimeFigureOut">
               <a:rPr lang="en-US" smtClean="0"/>
-              <a:t>8/24/20</a:t>
+              <a:t>8/26/20</a:t>
             </a:fld>
             <a:endParaRPr lang="en-US"/>
           </a:p>
@@ -3364,7 +3374,10 @@
           <a:bodyPr/>
           <a:lstStyle/>
           <a:p>
-            <a:endParaRPr lang="en-US"/>
+            <a:r>
+              <a:rPr lang="en-US" dirty="0"/>
+              <a:t>Week 1 Notes</a:t>
+            </a:r>
           </a:p>
         </p:txBody>
       </p:sp>
@@ -3389,7 +3402,10 @@
           <a:bodyPr/>
           <a:lstStyle/>
           <a:p>
-            <a:endParaRPr lang="en-US"/>
+            <a:r>
+              <a:rPr lang="en-US" dirty="0"/>
+              <a:t>PHY495: Hoop Never Misses</a:t>
+            </a:r>
           </a:p>
         </p:txBody>
       </p:sp>
@@ -3428,6 +3444,478 @@
           <p:cNvPr id="2" name="Title 1">
             <a:extLst>
               <a:ext uri="{FF2B5EF4-FFF2-40B4-BE49-F238E27FC236}">
+                <a16:creationId xmlns:a16="http://schemas.microsoft.com/office/drawing/2014/main" id="{5C7E76B8-3C98-EA41-9DC4-C65845C559EA}"/>
+              </a:ext>
+            </a:extLst>
+          </p:cNvPr>
+          <p:cNvSpPr>
+            <a:spLocks noGrp="1"/>
+          </p:cNvSpPr>
+          <p:nvPr>
+            <p:ph type="title"/>
+          </p:nvPr>
+        </p:nvSpPr>
+        <p:spPr/>
+        <p:txBody>
+          <a:bodyPr/>
+          <a:lstStyle/>
+          <a:p>
+            <a:r>
+              <a:rPr lang="en-US" dirty="0"/>
+              <a:t>What I’ve Done</a:t>
+            </a:r>
+          </a:p>
+        </p:txBody>
+      </p:sp>
+      <p:sp>
+        <p:nvSpPr>
+          <p:cNvPr id="3" name="Content Placeholder 2">
+            <a:extLst>
+              <a:ext uri="{FF2B5EF4-FFF2-40B4-BE49-F238E27FC236}">
+                <a16:creationId xmlns:a16="http://schemas.microsoft.com/office/drawing/2014/main" id="{88A8244F-E0BD-1745-8A5D-B51A6D3F8B3E}"/>
+              </a:ext>
+            </a:extLst>
+          </p:cNvPr>
+          <p:cNvSpPr>
+            <a:spLocks noGrp="1"/>
+          </p:cNvSpPr>
+          <p:nvPr>
+            <p:ph idx="1"/>
+          </p:nvPr>
+        </p:nvSpPr>
+        <p:spPr/>
+        <p:txBody>
+          <a:bodyPr/>
+          <a:lstStyle/>
+          <a:p>
+            <a:r>
+              <a:rPr lang="en-US" dirty="0"/>
+              <a:t>Learned about GitHub, set up a repository and started to create files</a:t>
+            </a:r>
+          </a:p>
+          <a:p>
+            <a:r>
+              <a:rPr lang="en-US" dirty="0"/>
+              <a:t>Plotted the 2D trajectory of a basketball subject to the drag force and force due to gravity</a:t>
+            </a:r>
+          </a:p>
+        </p:txBody>
+      </p:sp>
+    </p:spTree>
+    <p:extLst>
+      <p:ext uri="{BB962C8B-B14F-4D97-AF65-F5344CB8AC3E}">
+        <p14:creationId xmlns:p14="http://schemas.microsoft.com/office/powerpoint/2010/main" val="2943484032"/>
+      </p:ext>
+    </p:extLst>
+  </p:cSld>
+  <p:clrMapOvr>
+    <a:masterClrMapping/>
+  </p:clrMapOvr>
+</p:sld>
+</file>
+
+<file path=ppt/slides/slide3.xml><?xml version="1.0" encoding="utf-8"?>
+<p:sld xmlns:a="http://schemas.openxmlformats.org/drawingml/2006/main" xmlns:r="http://schemas.openxmlformats.org/officeDocument/2006/relationships" xmlns:p="http://schemas.openxmlformats.org/presentationml/2006/main">
+  <p:cSld>
+    <p:spTree>
+      <p:nvGrpSpPr>
+        <p:cNvPr id="1" name=""/>
+        <p:cNvGrpSpPr/>
+        <p:nvPr/>
+      </p:nvGrpSpPr>
+      <p:grpSpPr>
+        <a:xfrm>
+          <a:off x="0" y="0"/>
+          <a:ext cx="0" cy="0"/>
+          <a:chOff x="0" y="0"/>
+          <a:chExt cx="0" cy="0"/>
+        </a:xfrm>
+      </p:grpSpPr>
+      <p:sp>
+        <p:nvSpPr>
+          <p:cNvPr id="2" name="Title 1">
+            <a:extLst>
+              <a:ext uri="{FF2B5EF4-FFF2-40B4-BE49-F238E27FC236}">
+                <a16:creationId xmlns:a16="http://schemas.microsoft.com/office/drawing/2014/main" id="{24ECD7AB-DC08-8748-BEEA-1B8C10389752}"/>
+              </a:ext>
+            </a:extLst>
+          </p:cNvPr>
+          <p:cNvSpPr>
+            <a:spLocks noGrp="1"/>
+          </p:cNvSpPr>
+          <p:nvPr>
+            <p:ph type="title"/>
+          </p:nvPr>
+        </p:nvSpPr>
+        <p:spPr/>
+        <p:txBody>
+          <a:bodyPr/>
+          <a:lstStyle/>
+          <a:p>
+            <a:r>
+              <a:rPr lang="en-US" dirty="0"/>
+              <a:t>What Worked</a:t>
+            </a:r>
+          </a:p>
+        </p:txBody>
+      </p:sp>
+      <p:sp>
+        <p:nvSpPr>
+          <p:cNvPr id="3" name="Content Placeholder 2">
+            <a:extLst>
+              <a:ext uri="{FF2B5EF4-FFF2-40B4-BE49-F238E27FC236}">
+                <a16:creationId xmlns:a16="http://schemas.microsoft.com/office/drawing/2014/main" id="{D5D8EBE2-2AE2-ED42-9FAE-C2C83086336B}"/>
+              </a:ext>
+            </a:extLst>
+          </p:cNvPr>
+          <p:cNvSpPr>
+            <a:spLocks noGrp="1"/>
+          </p:cNvSpPr>
+          <p:nvPr>
+            <p:ph idx="1"/>
+          </p:nvPr>
+        </p:nvSpPr>
+        <p:spPr/>
+        <p:txBody>
+          <a:bodyPr/>
+          <a:lstStyle/>
+          <a:p>
+            <a:r>
+              <a:rPr lang="en-US" dirty="0"/>
+              <a:t>Successfully set up GitHub</a:t>
+            </a:r>
+          </a:p>
+          <a:p>
+            <a:r>
+              <a:rPr lang="en-US" dirty="0"/>
+              <a:t>2D trajectory of the basketball worked with the two forces that I included</a:t>
+            </a:r>
+          </a:p>
+          <a:p>
+            <a:endParaRPr lang="en-US" dirty="0"/>
+          </a:p>
+        </p:txBody>
+      </p:sp>
+    </p:spTree>
+    <p:extLst>
+      <p:ext uri="{BB962C8B-B14F-4D97-AF65-F5344CB8AC3E}">
+        <p14:creationId xmlns:p14="http://schemas.microsoft.com/office/powerpoint/2010/main" val="2375921839"/>
+      </p:ext>
+    </p:extLst>
+  </p:cSld>
+  <p:clrMapOvr>
+    <a:masterClrMapping/>
+  </p:clrMapOvr>
+</p:sld>
+</file>
+
+<file path=ppt/slides/slide4.xml><?xml version="1.0" encoding="utf-8"?>
+<p:sld xmlns:a="http://schemas.openxmlformats.org/drawingml/2006/main" xmlns:r="http://schemas.openxmlformats.org/officeDocument/2006/relationships" xmlns:p="http://schemas.openxmlformats.org/presentationml/2006/main">
+  <p:cSld>
+    <p:spTree>
+      <p:nvGrpSpPr>
+        <p:cNvPr id="1" name=""/>
+        <p:cNvGrpSpPr/>
+        <p:nvPr/>
+      </p:nvGrpSpPr>
+      <p:grpSpPr>
+        <a:xfrm>
+          <a:off x="0" y="0"/>
+          <a:ext cx="0" cy="0"/>
+          <a:chOff x="0" y="0"/>
+          <a:chExt cx="0" cy="0"/>
+        </a:xfrm>
+      </p:grpSpPr>
+      <p:sp>
+        <p:nvSpPr>
+          <p:cNvPr id="2" name="Title 1">
+            <a:extLst>
+              <a:ext uri="{FF2B5EF4-FFF2-40B4-BE49-F238E27FC236}">
+                <a16:creationId xmlns:a16="http://schemas.microsoft.com/office/drawing/2014/main" id="{E1AD23BF-FDDB-5446-9761-4096FCEF8954}"/>
+              </a:ext>
+            </a:extLst>
+          </p:cNvPr>
+          <p:cNvSpPr>
+            <a:spLocks noGrp="1"/>
+          </p:cNvSpPr>
+          <p:nvPr>
+            <p:ph type="title"/>
+          </p:nvPr>
+        </p:nvSpPr>
+        <p:spPr/>
+        <p:txBody>
+          <a:bodyPr/>
+          <a:lstStyle/>
+          <a:p>
+            <a:r>
+              <a:rPr lang="en-US" dirty="0"/>
+              <a:t>What Didn’t Work</a:t>
+            </a:r>
+          </a:p>
+        </p:txBody>
+      </p:sp>
+      <p:sp>
+        <p:nvSpPr>
+          <p:cNvPr id="3" name="Content Placeholder 2">
+            <a:extLst>
+              <a:ext uri="{FF2B5EF4-FFF2-40B4-BE49-F238E27FC236}">
+                <a16:creationId xmlns:a16="http://schemas.microsoft.com/office/drawing/2014/main" id="{375B407B-EE9F-3F44-8A42-8B04427F86D2}"/>
+              </a:ext>
+            </a:extLst>
+          </p:cNvPr>
+          <p:cNvSpPr>
+            <a:spLocks noGrp="1"/>
+          </p:cNvSpPr>
+          <p:nvPr>
+            <p:ph idx="1"/>
+          </p:nvPr>
+        </p:nvSpPr>
+        <p:spPr/>
+        <p:txBody>
+          <a:bodyPr/>
+          <a:lstStyle/>
+          <a:p>
+            <a:r>
+              <a:rPr lang="en-US" dirty="0"/>
+              <a:t>Had some computer problems with Anaconda and running files in Terminal so spent some time trying to troubleshoot that</a:t>
+            </a:r>
+          </a:p>
+        </p:txBody>
+      </p:sp>
+    </p:spTree>
+    <p:extLst>
+      <p:ext uri="{BB962C8B-B14F-4D97-AF65-F5344CB8AC3E}">
+        <p14:creationId xmlns:p14="http://schemas.microsoft.com/office/powerpoint/2010/main" val="2838729445"/>
+      </p:ext>
+    </p:extLst>
+  </p:cSld>
+  <p:clrMapOvr>
+    <a:masterClrMapping/>
+  </p:clrMapOvr>
+</p:sld>
+</file>
+
+<file path=ppt/slides/slide5.xml><?xml version="1.0" encoding="utf-8"?>
+<p:sld xmlns:a="http://schemas.openxmlformats.org/drawingml/2006/main" xmlns:r="http://schemas.openxmlformats.org/officeDocument/2006/relationships" xmlns:p="http://schemas.openxmlformats.org/presentationml/2006/main">
+  <p:cSld>
+    <p:spTree>
+      <p:nvGrpSpPr>
+        <p:cNvPr id="1" name=""/>
+        <p:cNvGrpSpPr/>
+        <p:nvPr/>
+      </p:nvGrpSpPr>
+      <p:grpSpPr>
+        <a:xfrm>
+          <a:off x="0" y="0"/>
+          <a:ext cx="0" cy="0"/>
+          <a:chOff x="0" y="0"/>
+          <a:chExt cx="0" cy="0"/>
+        </a:xfrm>
+      </p:grpSpPr>
+      <p:sp>
+        <p:nvSpPr>
+          <p:cNvPr id="2" name="Title 1">
+            <a:extLst>
+              <a:ext uri="{FF2B5EF4-FFF2-40B4-BE49-F238E27FC236}">
+                <a16:creationId xmlns:a16="http://schemas.microsoft.com/office/drawing/2014/main" id="{C823C9FA-4BEE-5C4E-9316-F0B6434372C8}"/>
+              </a:ext>
+            </a:extLst>
+          </p:cNvPr>
+          <p:cNvSpPr>
+            <a:spLocks noGrp="1"/>
+          </p:cNvSpPr>
+          <p:nvPr>
+            <p:ph type="title"/>
+          </p:nvPr>
+        </p:nvSpPr>
+        <p:spPr/>
+        <p:txBody>
+          <a:bodyPr/>
+          <a:lstStyle/>
+          <a:p>
+            <a:r>
+              <a:rPr lang="en-US" dirty="0"/>
+              <a:t>Where am I Stuck</a:t>
+            </a:r>
+          </a:p>
+        </p:txBody>
+      </p:sp>
+      <p:sp>
+        <p:nvSpPr>
+          <p:cNvPr id="3" name="Content Placeholder 2">
+            <a:extLst>
+              <a:ext uri="{FF2B5EF4-FFF2-40B4-BE49-F238E27FC236}">
+                <a16:creationId xmlns:a16="http://schemas.microsoft.com/office/drawing/2014/main" id="{E52EB484-88A7-C64A-81EB-932903AFFEE6}"/>
+              </a:ext>
+            </a:extLst>
+          </p:cNvPr>
+          <p:cNvSpPr>
+            <a:spLocks noGrp="1"/>
+          </p:cNvSpPr>
+          <p:nvPr>
+            <p:ph idx="1"/>
+          </p:nvPr>
+        </p:nvSpPr>
+        <p:spPr/>
+        <p:txBody>
+          <a:bodyPr/>
+          <a:lstStyle/>
+          <a:p>
+            <a:r>
+              <a:rPr lang="en-US" dirty="0"/>
+              <a:t>For simplicity, I only included the drag force and the force due to gravity. Should I be including the Magnus Force for the spin of the basketball? How is this calculated?</a:t>
+            </a:r>
+          </a:p>
+          <a:p>
+            <a:r>
+              <a:rPr lang="en-US" dirty="0"/>
+              <a:t>In the WORK-ENERGY Theorem for calculating the velocity of the basketball after its collision with the backboard, what should I use for the displacement of the basketball on the backboard in calculating the work due to friction?</a:t>
+            </a:r>
+          </a:p>
+          <a:p>
+            <a:r>
+              <a:rPr lang="en-US" dirty="0"/>
+              <a:t>The coefficient of friction that I used was for a tempered glass backboard – are we able to build with this or do we need to find a new coefficient of friction?</a:t>
+            </a:r>
+          </a:p>
+          <a:p>
+            <a:endParaRPr lang="en-US" dirty="0"/>
+          </a:p>
+        </p:txBody>
+      </p:sp>
+    </p:spTree>
+    <p:extLst>
+      <p:ext uri="{BB962C8B-B14F-4D97-AF65-F5344CB8AC3E}">
+        <p14:creationId xmlns:p14="http://schemas.microsoft.com/office/powerpoint/2010/main" val="3301693119"/>
+      </p:ext>
+    </p:extLst>
+  </p:cSld>
+  <p:clrMapOvr>
+    <a:masterClrMapping/>
+  </p:clrMapOvr>
+</p:sld>
+</file>
+
+<file path=ppt/slides/slide6.xml><?xml version="1.0" encoding="utf-8"?>
+<p:sld xmlns:a="http://schemas.openxmlformats.org/drawingml/2006/main" xmlns:r="http://schemas.openxmlformats.org/officeDocument/2006/relationships" xmlns:p="http://schemas.openxmlformats.org/presentationml/2006/main">
+  <p:cSld>
+    <p:spTree>
+      <p:nvGrpSpPr>
+        <p:cNvPr id="1" name=""/>
+        <p:cNvGrpSpPr/>
+        <p:nvPr/>
+      </p:nvGrpSpPr>
+      <p:grpSpPr>
+        <a:xfrm>
+          <a:off x="0" y="0"/>
+          <a:ext cx="0" cy="0"/>
+          <a:chOff x="0" y="0"/>
+          <a:chExt cx="0" cy="0"/>
+        </a:xfrm>
+      </p:grpSpPr>
+      <p:sp>
+        <p:nvSpPr>
+          <p:cNvPr id="2" name="Title 1">
+            <a:extLst>
+              <a:ext uri="{FF2B5EF4-FFF2-40B4-BE49-F238E27FC236}">
+                <a16:creationId xmlns:a16="http://schemas.microsoft.com/office/drawing/2014/main" id="{0217750C-086C-FA40-A22B-F8E4428EE2B3}"/>
+              </a:ext>
+            </a:extLst>
+          </p:cNvPr>
+          <p:cNvSpPr>
+            <a:spLocks noGrp="1"/>
+          </p:cNvSpPr>
+          <p:nvPr>
+            <p:ph type="title"/>
+          </p:nvPr>
+        </p:nvSpPr>
+        <p:spPr/>
+        <p:txBody>
+          <a:bodyPr/>
+          <a:lstStyle/>
+          <a:p>
+            <a:r>
+              <a:rPr lang="en-US" dirty="0"/>
+              <a:t>What Next?</a:t>
+            </a:r>
+          </a:p>
+        </p:txBody>
+      </p:sp>
+      <p:sp>
+        <p:nvSpPr>
+          <p:cNvPr id="3" name="Content Placeholder 2">
+            <a:extLst>
+              <a:ext uri="{FF2B5EF4-FFF2-40B4-BE49-F238E27FC236}">
+                <a16:creationId xmlns:a16="http://schemas.microsoft.com/office/drawing/2014/main" id="{1DE1F165-4A66-E74E-8D81-894DA0F4BDB2}"/>
+              </a:ext>
+            </a:extLst>
+          </p:cNvPr>
+          <p:cNvSpPr>
+            <a:spLocks noGrp="1"/>
+          </p:cNvSpPr>
+          <p:nvPr>
+            <p:ph idx="1"/>
+          </p:nvPr>
+        </p:nvSpPr>
+        <p:spPr/>
+        <p:txBody>
+          <a:bodyPr/>
+          <a:lstStyle/>
+          <a:p>
+            <a:r>
+              <a:rPr lang="en-US" dirty="0"/>
+              <a:t>Add Magnus Force?</a:t>
+            </a:r>
+          </a:p>
+          <a:p>
+            <a:r>
+              <a:rPr lang="en-US" dirty="0"/>
+              <a:t>Add backboard for all shots</a:t>
+            </a:r>
+          </a:p>
+          <a:p>
+            <a:r>
+              <a:rPr lang="en-US" dirty="0"/>
+              <a:t>Extend to 3D – I understand how to do this mathematically (adding another dimension that the initial velocity is in, so adding a third second-order differential equation) but how should I show this graphically?</a:t>
+            </a:r>
+          </a:p>
+        </p:txBody>
+      </p:sp>
+    </p:spTree>
+    <p:extLst>
+      <p:ext uri="{BB962C8B-B14F-4D97-AF65-F5344CB8AC3E}">
+        <p14:creationId xmlns:p14="http://schemas.microsoft.com/office/powerpoint/2010/main" val="3935020709"/>
+      </p:ext>
+    </p:extLst>
+  </p:cSld>
+  <p:clrMapOvr>
+    <a:masterClrMapping/>
+  </p:clrMapOvr>
+</p:sld>
+</file>
+
+<file path=ppt/slides/slide7.xml><?xml version="1.0" encoding="utf-8"?>
+<p:sld xmlns:a="http://schemas.openxmlformats.org/drawingml/2006/main" xmlns:r="http://schemas.openxmlformats.org/officeDocument/2006/relationships" xmlns:p="http://schemas.openxmlformats.org/presentationml/2006/main">
+  <p:cSld>
+    <p:spTree>
+      <p:nvGrpSpPr>
+        <p:cNvPr id="1" name=""/>
+        <p:cNvGrpSpPr/>
+        <p:nvPr/>
+      </p:nvGrpSpPr>
+      <p:grpSpPr>
+        <a:xfrm>
+          <a:off x="0" y="0"/>
+          <a:ext cx="0" cy="0"/>
+          <a:chOff x="0" y="0"/>
+          <a:chExt cx="0" cy="0"/>
+        </a:xfrm>
+      </p:grpSpPr>
+      <p:sp>
+        <p:nvSpPr>
+          <p:cNvPr id="2" name="Title 1">
+            <a:extLst>
+              <a:ext uri="{FF2B5EF4-FFF2-40B4-BE49-F238E27FC236}">
                 <a16:creationId xmlns:a16="http://schemas.microsoft.com/office/drawing/2014/main" id="{7D0886DD-9F18-0D44-BA5D-787DD777D833}"/>
               </a:ext>
             </a:extLst>
@@ -3444,7 +3932,10 @@
           <a:bodyPr/>
           <a:lstStyle/>
           <a:p>
-            <a:endParaRPr lang="en-US"/>
+            <a:r>
+              <a:rPr lang="en-US" dirty="0"/>
+              <a:t>Sources</a:t>
+            </a:r>
           </a:p>
         </p:txBody>
       </p:sp>
@@ -3466,7 +3957,9 @@
         </p:nvSpPr>
         <p:spPr/>
         <p:txBody>
-          <a:bodyPr/>
+          <a:bodyPr>
+            <a:normAutofit/>
+          </a:bodyPr>
           <a:lstStyle/>
           <a:p>
             <a:r>
@@ -3505,7 +3998,33 @@
               </a:rPr>
               <a:t>https://en.wikipedia.org/wiki/Density_of_air</a:t>
             </a:r>
-            <a:endParaRPr lang="en-US"/>
+            <a:endParaRPr lang="en-US" dirty="0"/>
+          </a:p>
+          <a:p>
+            <a:r>
+              <a:rPr lang="en-US" dirty="0"/>
+              <a:t>BACKBOARD: </a:t>
+            </a:r>
+            <a:r>
+              <a:rPr lang="en-US" dirty="0">
+                <a:hlinkClick r:id="rId5"/>
+              </a:rPr>
+              <a:t>https://www.stack.com/a/basketball-court-dimensions</a:t>
+            </a:r>
+            <a:endParaRPr lang="en-US" dirty="0"/>
+          </a:p>
+          <a:p>
+            <a:r>
+              <a:rPr lang="en-US" dirty="0"/>
+              <a:t>COEFFICIENT OF FRICTION: </a:t>
+            </a:r>
+            <a:r>
+              <a:rPr lang="en-US" dirty="0">
+                <a:hlinkClick r:id="rId6"/>
+              </a:rPr>
+              <a:t>HERE</a:t>
+            </a:r>
+            <a:endParaRPr lang="en-US" dirty="0"/>
           </a:p>
           <a:p>
             <a:endParaRPr lang="en-US" dirty="0"/>

</xml_diff>